<commit_message>
Label update in polar rose charts
</commit_message>
<xml_diff>
--- a/infografia.pptx
+++ b/infografia.pptx
@@ -3055,7 +3055,7 @@
         </p:blipFill>
         <p:spPr>
           <a:xfrm>
-            <a:off x="12493182" y="10362399"/>
+            <a:off x="12829732" y="10400499"/>
             <a:ext cx="3943900" cy="2238687"/>
           </a:xfrm>
           <a:prstGeom prst="rect">
@@ -3589,14 +3589,7 @@
                 <a:latin typeface="Helvetica" panose="020B0604020202020204" pitchFamily="34" charset="0"/>
                 <a:cs typeface="Helvetica" panose="020B0604020202020204" pitchFamily="34" charset="0"/>
               </a:rPr>
-              <a:t>se duplicó </a:t>
-            </a:r>
-            <a:r>
-              <a:rPr lang="es-AR" sz="2100" b="1" dirty="0" smtClean="0">
-                <a:latin typeface="Helvetica" panose="020B0604020202020204" pitchFamily="34" charset="0"/>
-                <a:cs typeface="Helvetica" panose="020B0604020202020204" pitchFamily="34" charset="0"/>
-              </a:rPr>
-              <a:t>en 2020</a:t>
+              <a:t>se duplicó en 2020</a:t>
             </a:r>
             <a:r>
               <a:rPr lang="es-AR" sz="2100" dirty="0" smtClean="0">
@@ -3763,36 +3756,242 @@
           </a:prstGeom>
         </p:spPr>
       </p:pic>
-      <p:pic>
-        <p:nvPicPr>
-          <p:cNvPr id="15" name="Imagen 14"/>
-          <p:cNvPicPr>
-            <a:picLocks noChangeAspect="1"/>
-          </p:cNvPicPr>
+      <p:sp>
+        <p:nvSpPr>
+          <p:cNvPr id="27" name="Rectángulo 26"/>
+          <p:cNvSpPr/>
           <p:nvPr/>
-        </p:nvPicPr>
-        <p:blipFill>
-          <a:blip r:embed="rId17" cstate="print">
-            <a:extLst>
-              <a:ext uri="{28A0092B-C50C-407E-A947-70E740481C1C}">
-                <a14:useLocalDpi xmlns:a14="http://schemas.microsoft.com/office/drawing/2010/main" val="0"/>
-              </a:ext>
-            </a:extLst>
-          </a:blip>
-          <a:stretch>
-            <a:fillRect/>
-          </a:stretch>
-        </p:blipFill>
-        <p:spPr>
-          <a:xfrm>
-            <a:off x="20402549" y="15075771"/>
-            <a:ext cx="2889991" cy="638691"/>
+        </p:nvSpPr>
+        <p:spPr>
+          <a:xfrm>
+            <a:off x="19716832" y="15208214"/>
+            <a:ext cx="2882277" cy="571117"/>
           </a:xfrm>
           <a:prstGeom prst="rect">
             <a:avLst/>
           </a:prstGeom>
-        </p:spPr>
-      </p:pic>
+          <a:solidFill>
+            <a:srgbClr val="F7945D"/>
+          </a:solidFill>
+          <a:ln>
+            <a:solidFill>
+              <a:schemeClr val="tx1"/>
+            </a:solidFill>
+          </a:ln>
+        </p:spPr>
+        <p:style>
+          <a:lnRef idx="2">
+            <a:schemeClr val="accent1">
+              <a:shade val="50000"/>
+            </a:schemeClr>
+          </a:lnRef>
+          <a:fillRef idx="1">
+            <a:schemeClr val="accent1"/>
+          </a:fillRef>
+          <a:effectRef idx="0">
+            <a:schemeClr val="accent1"/>
+          </a:effectRef>
+          <a:fontRef idx="minor">
+            <a:schemeClr val="lt1"/>
+          </a:fontRef>
+        </p:style>
+        <p:txBody>
+          <a:bodyPr rot="0" spcFirstLastPara="0" vertOverflow="overflow" horzOverflow="overflow" vert="horz" wrap="square" lIns="91440" tIns="45720" rIns="91440" bIns="45720" numCol="1" spcCol="0" rtlCol="0" fromWordArt="0" anchor="ctr" anchorCtr="0" forceAA="0" compatLnSpc="1">
+            <a:prstTxWarp prst="textNoShape">
+              <a:avLst/>
+            </a:prstTxWarp>
+            <a:noAutofit/>
+          </a:bodyPr>
+          <a:lstStyle/>
+          <a:p>
+            <a:r>
+              <a:rPr lang="es-AR" sz="1200" dirty="0" smtClean="0">
+                <a:solidFill>
+                  <a:schemeClr val="tx1"/>
+                </a:solidFill>
+              </a:rPr>
+              <a:t>Tipo de delito = Homicidio</a:t>
+            </a:r>
+          </a:p>
+          <a:p>
+            <a:r>
+              <a:rPr lang="es-AR" sz="1200" dirty="0" smtClean="0">
+                <a:solidFill>
+                  <a:schemeClr val="tx1"/>
+                </a:solidFill>
+              </a:rPr>
+              <a:t>Tasa de delitos cometidos [%] = 0.301</a:t>
+            </a:r>
+          </a:p>
+          <a:p>
+            <a:r>
+              <a:rPr lang="es-AR" sz="1200" dirty="0" smtClean="0">
+                <a:solidFill>
+                  <a:schemeClr val="tx1"/>
+                </a:solidFill>
+              </a:rPr>
+              <a:t>Año=2020</a:t>
+            </a:r>
+            <a:endParaRPr lang="en-US" sz="1200" dirty="0">
+              <a:solidFill>
+                <a:schemeClr val="tx1"/>
+              </a:solidFill>
+            </a:endParaRPr>
+          </a:p>
+        </p:txBody>
+      </p:sp>
+      <p:cxnSp>
+        <p:nvCxnSpPr>
+          <p:cNvPr id="12" name="Conector recto de flecha 11"/>
+          <p:cNvCxnSpPr>
+            <a:stCxn id="27" idx="0"/>
+          </p:cNvCxnSpPr>
+          <p:nvPr/>
+        </p:nvCxnSpPr>
+        <p:spPr>
+          <a:xfrm flipV="1">
+            <a:off x="21157971" y="14674850"/>
+            <a:ext cx="635229" cy="533364"/>
+          </a:xfrm>
+          <a:prstGeom prst="straightConnector1">
+            <a:avLst/>
+          </a:prstGeom>
+          <a:ln>
+            <a:tailEnd type="triangle"/>
+          </a:ln>
+        </p:spPr>
+        <p:style>
+          <a:lnRef idx="3">
+            <a:schemeClr val="dk1"/>
+          </a:lnRef>
+          <a:fillRef idx="0">
+            <a:schemeClr val="dk1"/>
+          </a:fillRef>
+          <a:effectRef idx="2">
+            <a:schemeClr val="dk1"/>
+          </a:effectRef>
+          <a:fontRef idx="minor">
+            <a:schemeClr val="tx1"/>
+          </a:fontRef>
+        </p:style>
+      </p:cxnSp>
+      <p:sp>
+        <p:nvSpPr>
+          <p:cNvPr id="32" name="Rectángulo 31"/>
+          <p:cNvSpPr/>
+          <p:nvPr/>
+        </p:nvSpPr>
+        <p:spPr>
+          <a:xfrm>
+            <a:off x="13426467" y="15208214"/>
+            <a:ext cx="2882277" cy="571117"/>
+          </a:xfrm>
+          <a:prstGeom prst="rect">
+            <a:avLst/>
+          </a:prstGeom>
+          <a:solidFill>
+            <a:srgbClr val="ECDA9A"/>
+          </a:solidFill>
+          <a:ln>
+            <a:solidFill>
+              <a:schemeClr val="tx1"/>
+            </a:solidFill>
+          </a:ln>
+        </p:spPr>
+        <p:style>
+          <a:lnRef idx="2">
+            <a:schemeClr val="accent1">
+              <a:shade val="50000"/>
+            </a:schemeClr>
+          </a:lnRef>
+          <a:fillRef idx="1">
+            <a:schemeClr val="accent1"/>
+          </a:fillRef>
+          <a:effectRef idx="0">
+            <a:schemeClr val="accent1"/>
+          </a:effectRef>
+          <a:fontRef idx="minor">
+            <a:schemeClr val="lt1"/>
+          </a:fontRef>
+        </p:style>
+        <p:txBody>
+          <a:bodyPr rot="0" spcFirstLastPara="0" vertOverflow="overflow" horzOverflow="overflow" vert="horz" wrap="square" lIns="91440" tIns="45720" rIns="91440" bIns="45720" numCol="1" spcCol="0" rtlCol="0" fromWordArt="0" anchor="ctr" anchorCtr="0" forceAA="0" compatLnSpc="1">
+            <a:prstTxWarp prst="textNoShape">
+              <a:avLst/>
+            </a:prstTxWarp>
+            <a:noAutofit/>
+          </a:bodyPr>
+          <a:lstStyle/>
+          <a:p>
+            <a:r>
+              <a:rPr lang="es-AR" sz="1200" dirty="0" smtClean="0">
+                <a:solidFill>
+                  <a:schemeClr val="tx1"/>
+                </a:solidFill>
+              </a:rPr>
+              <a:t>Día del delito = domingo</a:t>
+            </a:r>
+          </a:p>
+          <a:p>
+            <a:r>
+              <a:rPr lang="es-AR" sz="1200" dirty="0" smtClean="0">
+                <a:solidFill>
+                  <a:schemeClr val="tx1"/>
+                </a:solidFill>
+              </a:rPr>
+              <a:t>Tasa de delitos cometidos [%] = 11.241</a:t>
+            </a:r>
+          </a:p>
+          <a:p>
+            <a:r>
+              <a:rPr lang="es-AR" sz="1200" dirty="0" smtClean="0">
+                <a:solidFill>
+                  <a:schemeClr val="tx1"/>
+                </a:solidFill>
+              </a:rPr>
+              <a:t>Año=2020</a:t>
+            </a:r>
+            <a:endParaRPr lang="en-US" sz="1200" dirty="0">
+              <a:solidFill>
+                <a:schemeClr val="tx1"/>
+              </a:solidFill>
+            </a:endParaRPr>
+          </a:p>
+        </p:txBody>
+      </p:sp>
+      <p:cxnSp>
+        <p:nvCxnSpPr>
+          <p:cNvPr id="33" name="Conector recto de flecha 32"/>
+          <p:cNvCxnSpPr/>
+          <p:nvPr/>
+        </p:nvCxnSpPr>
+        <p:spPr>
+          <a:xfrm flipV="1">
+            <a:off x="14867606" y="14847263"/>
+            <a:ext cx="769471" cy="360951"/>
+          </a:xfrm>
+          <a:prstGeom prst="straightConnector1">
+            <a:avLst/>
+          </a:prstGeom>
+          <a:ln>
+            <a:tailEnd type="triangle"/>
+          </a:ln>
+        </p:spPr>
+        <p:style>
+          <a:lnRef idx="3">
+            <a:schemeClr val="dk1"/>
+          </a:lnRef>
+          <a:fillRef idx="0">
+            <a:schemeClr val="dk1"/>
+          </a:fillRef>
+          <a:effectRef idx="2">
+            <a:schemeClr val="dk1"/>
+          </a:effectRef>
+          <a:fontRef idx="minor">
+            <a:schemeClr val="tx1"/>
+          </a:fontRef>
+        </p:style>
+      </p:cxnSp>
     </p:spTree>
     <p:extLst>
       <p:ext uri="{BB962C8B-B14F-4D97-AF65-F5344CB8AC3E}">

</xml_diff>